<commit_message>
First update to Jupyter Notebook with EDA
</commit_message>
<xml_diff>
--- a/Presentation1.pptx
+++ b/Presentation1.pptx
@@ -11,6 +11,7 @@
     <p:sldId id="259" r:id="rId5"/>
     <p:sldId id="260" r:id="rId6"/>
     <p:sldId id="261" r:id="rId7"/>
+    <p:sldId id="262" r:id="rId8"/>
   </p:sldIdLst>
   <p:sldSz cx="12192000" cy="6858000"/>
   <p:notesSz cx="6858000" cy="9144000"/>
@@ -4056,7 +4057,7 @@
               <a:rPr lang="en-US" dirty="0" err="1"/>
               <a:t>training_data_normal.tsv</a:t>
             </a:r>
-            <a:endParaRPr lang="en-US"/>
+            <a:endParaRPr lang="en-US" dirty="0"/>
           </a:p>
           <a:p>
             <a:endParaRPr lang="en-VN" dirty="0"/>
@@ -4067,6 +4068,89 @@
     <p:extLst>
       <p:ext uri="{BB962C8B-B14F-4D97-AF65-F5344CB8AC3E}">
         <p14:creationId xmlns:p14="http://schemas.microsoft.com/office/powerpoint/2010/main" val="3042236911"/>
+      </p:ext>
+    </p:extLst>
+  </p:cSld>
+  <p:clrMapOvr>
+    <a:masterClrMapping/>
+  </p:clrMapOvr>
+</p:sld>
+</file>
+
+<file path=ppt/slides/slide7.xml><?xml version="1.0" encoding="utf-8"?>
+<p:sld xmlns:a="http://schemas.openxmlformats.org/drawingml/2006/main" xmlns:r="http://schemas.openxmlformats.org/officeDocument/2006/relationships" xmlns:p="http://schemas.openxmlformats.org/presentationml/2006/main">
+  <p:cSld>
+    <p:spTree>
+      <p:nvGrpSpPr>
+        <p:cNvPr id="1" name=""/>
+        <p:cNvGrpSpPr/>
+        <p:nvPr/>
+      </p:nvGrpSpPr>
+      <p:grpSpPr>
+        <a:xfrm>
+          <a:off x="0" y="0"/>
+          <a:ext cx="0" cy="0"/>
+          <a:chOff x="0" y="0"/>
+          <a:chExt cx="0" cy="0"/>
+        </a:xfrm>
+      </p:grpSpPr>
+      <p:sp>
+        <p:nvSpPr>
+          <p:cNvPr id="2" name="Title 1">
+            <a:extLst>
+              <a:ext uri="{FF2B5EF4-FFF2-40B4-BE49-F238E27FC236}">
+                <a16:creationId xmlns:a16="http://schemas.microsoft.com/office/drawing/2014/main" id="{F4537DFC-D709-7081-5A07-DF436B8CEC8C}"/>
+              </a:ext>
+            </a:extLst>
+          </p:cNvPr>
+          <p:cNvSpPr>
+            <a:spLocks noGrp="1"/>
+          </p:cNvSpPr>
+          <p:nvPr>
+            <p:ph type="title"/>
+          </p:nvPr>
+        </p:nvSpPr>
+        <p:spPr/>
+        <p:txBody>
+          <a:bodyPr/>
+          <a:lstStyle/>
+          <a:p>
+            <a:r>
+              <a:rPr lang="en-VN" dirty="0"/>
+              <a:t>Data Wrangling</a:t>
+            </a:r>
+          </a:p>
+        </p:txBody>
+      </p:sp>
+      <p:sp>
+        <p:nvSpPr>
+          <p:cNvPr id="3" name="Content Placeholder 2">
+            <a:extLst>
+              <a:ext uri="{FF2B5EF4-FFF2-40B4-BE49-F238E27FC236}">
+                <a16:creationId xmlns:a16="http://schemas.microsoft.com/office/drawing/2014/main" id="{6F8976A6-5C4C-6729-4623-009204AA4210}"/>
+              </a:ext>
+            </a:extLst>
+          </p:cNvPr>
+          <p:cNvSpPr>
+            <a:spLocks noGrp="1"/>
+          </p:cNvSpPr>
+          <p:nvPr>
+            <p:ph idx="1"/>
+          </p:nvPr>
+        </p:nvSpPr>
+        <p:spPr/>
+        <p:txBody>
+          <a:bodyPr/>
+          <a:lstStyle/>
+          <a:p>
+            <a:endParaRPr lang="en-VN"/>
+          </a:p>
+        </p:txBody>
+      </p:sp>
+    </p:spTree>
+    <p:extLst>
+      <p:ext uri="{BB962C8B-B14F-4D97-AF65-F5344CB8AC3E}">
+        <p14:creationId xmlns:p14="http://schemas.microsoft.com/office/powerpoint/2010/main" val="36143799"/>
       </p:ext>
     </p:extLst>
   </p:cSld>

</xml_diff>